<commit_message>
1. Business Context 2. Technical Context
</commit_message>
<xml_diff>
--- a/OrderManagement/MultiProjectSample/Content/images/System Context.pptx
+++ b/OrderManagement/MultiProjectSample/Content/images/System Context.pptx
@@ -6,7 +6,8 @@
   </p:sldMasterIdLst>
   <p:sldIdLst>
     <p:sldId id="256" r:id="rId2"/>
-    <p:sldId id="267" r:id="rId3"/>
+    <p:sldId id="268" r:id="rId3"/>
+    <p:sldId id="267" r:id="rId4"/>
   </p:sldIdLst>
   <p:sldSz cx="9144000" cy="6858000" type="screen4x3"/>
   <p:notesSz cx="6858000" cy="9144000"/>
@@ -290,7 +291,7 @@
             <a:fld id="{A81FE3E5-8971-4F75-A2CB-6C5A4E3E921D}" type="datetimeFigureOut">
               <a:rPr lang="en-US" smtClean="0"/>
               <a:pPr/>
-              <a:t>5/15/2017</a:t>
+              <a:t>5/19/2017</a:t>
             </a:fld>
             <a:endParaRPr lang="en-US"/>
           </a:p>
@@ -457,7 +458,7 @@
             <a:fld id="{A81FE3E5-8971-4F75-A2CB-6C5A4E3E921D}" type="datetimeFigureOut">
               <a:rPr lang="en-US" smtClean="0"/>
               <a:pPr/>
-              <a:t>5/15/2017</a:t>
+              <a:t>5/19/2017</a:t>
             </a:fld>
             <a:endParaRPr lang="en-US"/>
           </a:p>
@@ -634,7 +635,7 @@
             <a:fld id="{A81FE3E5-8971-4F75-A2CB-6C5A4E3E921D}" type="datetimeFigureOut">
               <a:rPr lang="en-US" smtClean="0"/>
               <a:pPr/>
-              <a:t>5/15/2017</a:t>
+              <a:t>5/19/2017</a:t>
             </a:fld>
             <a:endParaRPr lang="en-US"/>
           </a:p>
@@ -801,7 +802,7 @@
             <a:fld id="{A81FE3E5-8971-4F75-A2CB-6C5A4E3E921D}" type="datetimeFigureOut">
               <a:rPr lang="en-US" smtClean="0"/>
               <a:pPr/>
-              <a:t>5/15/2017</a:t>
+              <a:t>5/19/2017</a:t>
             </a:fld>
             <a:endParaRPr lang="en-US"/>
           </a:p>
@@ -1044,7 +1045,7 @@
             <a:fld id="{A81FE3E5-8971-4F75-A2CB-6C5A4E3E921D}" type="datetimeFigureOut">
               <a:rPr lang="en-US" smtClean="0"/>
               <a:pPr/>
-              <a:t>5/15/2017</a:t>
+              <a:t>5/19/2017</a:t>
             </a:fld>
             <a:endParaRPr lang="en-US"/>
           </a:p>
@@ -1329,7 +1330,7 @@
             <a:fld id="{A81FE3E5-8971-4F75-A2CB-6C5A4E3E921D}" type="datetimeFigureOut">
               <a:rPr lang="en-US" smtClean="0"/>
               <a:pPr/>
-              <a:t>5/15/2017</a:t>
+              <a:t>5/19/2017</a:t>
             </a:fld>
             <a:endParaRPr lang="en-US"/>
           </a:p>
@@ -1748,7 +1749,7 @@
             <a:fld id="{A81FE3E5-8971-4F75-A2CB-6C5A4E3E921D}" type="datetimeFigureOut">
               <a:rPr lang="en-US" smtClean="0"/>
               <a:pPr/>
-              <a:t>5/15/2017</a:t>
+              <a:t>5/19/2017</a:t>
             </a:fld>
             <a:endParaRPr lang="en-US"/>
           </a:p>
@@ -1863,7 +1864,7 @@
             <a:fld id="{A81FE3E5-8971-4F75-A2CB-6C5A4E3E921D}" type="datetimeFigureOut">
               <a:rPr lang="en-US" smtClean="0"/>
               <a:pPr/>
-              <a:t>5/15/2017</a:t>
+              <a:t>5/19/2017</a:t>
             </a:fld>
             <a:endParaRPr lang="en-US"/>
           </a:p>
@@ -1955,7 +1956,7 @@
             <a:fld id="{A81FE3E5-8971-4F75-A2CB-6C5A4E3E921D}" type="datetimeFigureOut">
               <a:rPr lang="en-US" smtClean="0"/>
               <a:pPr/>
-              <a:t>5/15/2017</a:t>
+              <a:t>5/19/2017</a:t>
             </a:fld>
             <a:endParaRPr lang="en-US"/>
           </a:p>
@@ -2229,7 +2230,7 @@
             <a:fld id="{A81FE3E5-8971-4F75-A2CB-6C5A4E3E921D}" type="datetimeFigureOut">
               <a:rPr lang="en-US" smtClean="0"/>
               <a:pPr/>
-              <a:t>5/15/2017</a:t>
+              <a:t>5/19/2017</a:t>
             </a:fld>
             <a:endParaRPr lang="en-US"/>
           </a:p>
@@ -2479,7 +2480,7 @@
             <a:fld id="{A81FE3E5-8971-4F75-A2CB-6C5A4E3E921D}" type="datetimeFigureOut">
               <a:rPr lang="en-US" smtClean="0"/>
               <a:pPr/>
-              <a:t>5/15/2017</a:t>
+              <a:t>5/19/2017</a:t>
             </a:fld>
             <a:endParaRPr lang="en-US"/>
           </a:p>
@@ -2689,7 +2690,7 @@
             <a:fld id="{A81FE3E5-8971-4F75-A2CB-6C5A4E3E921D}" type="datetimeFigureOut">
               <a:rPr lang="en-US" smtClean="0"/>
               <a:pPr/>
-              <a:t>5/15/2017</a:t>
+              <a:t>5/19/2017</a:t>
             </a:fld>
             <a:endParaRPr lang="en-US"/>
           </a:p>
@@ -3140,6 +3141,1340 @@
       </p:grpSpPr>
       <p:sp>
         <p:nvSpPr>
+          <p:cNvPr id="4" name="Title 1"/>
+          <p:cNvSpPr>
+            <a:spLocks noGrp="1"/>
+          </p:cNvSpPr>
+          <p:nvPr>
+            <p:ph type="title"/>
+          </p:nvPr>
+        </p:nvSpPr>
+        <p:spPr>
+          <a:xfrm>
+            <a:off x="0" y="457200"/>
+            <a:ext cx="5105400" cy="381000"/>
+          </a:xfrm>
+        </p:spPr>
+        <p:style>
+          <a:lnRef idx="3">
+            <a:schemeClr val="lt1"/>
+          </a:lnRef>
+          <a:fillRef idx="1">
+            <a:schemeClr val="accent1"/>
+          </a:fillRef>
+          <a:effectRef idx="1">
+            <a:schemeClr val="accent1"/>
+          </a:effectRef>
+          <a:fontRef idx="minor">
+            <a:schemeClr val="lt1"/>
+          </a:fontRef>
+        </p:style>
+        <p:txBody>
+          <a:bodyPr>
+            <a:normAutofit fontScale="90000"/>
+          </a:bodyPr>
+          <a:lstStyle/>
+          <a:p>
+            <a:pPr algn="l"/>
+            <a:r>
+              <a:rPr lang="en-US" sz="2000" b="1" dirty="0" smtClean="0"/>
+              <a:t>High Level System Context</a:t>
+            </a:r>
+            <a:endParaRPr lang="en-US" sz="2000" b="1" dirty="0"/>
+          </a:p>
+        </p:txBody>
+      </p:sp>
+      <p:sp>
+        <p:nvSpPr>
+          <p:cNvPr id="6" name="Rectangle 13"/>
+          <p:cNvSpPr>
+            <a:spLocks noChangeArrowheads="1"/>
+          </p:cNvSpPr>
+          <p:nvPr/>
+        </p:nvSpPr>
+        <p:spPr bwMode="auto">
+          <a:xfrm>
+            <a:off x="2514600" y="1714484"/>
+            <a:ext cx="3505200" cy="2628916"/>
+          </a:xfrm>
+          <a:prstGeom prst="roundRect">
+            <a:avLst/>
+          </a:prstGeom>
+          <a:gradFill>
+            <a:gsLst>
+              <a:gs pos="28000">
+                <a:schemeClr val="bg1"/>
+              </a:gs>
+              <a:gs pos="73000">
+                <a:srgbClr val="DFE2EE"/>
+              </a:gs>
+            </a:gsLst>
+            <a:lin ang="4800000" scaled="0"/>
+          </a:gradFill>
+          <a:ln w="9525" algn="ctr">
+            <a:solidFill>
+              <a:schemeClr val="tx1"/>
+            </a:solidFill>
+            <a:round/>
+            <a:headEnd/>
+            <a:tailEnd/>
+          </a:ln>
+          <a:effectLst>
+            <a:glow rad="63500">
+              <a:srgbClr val="8899A0">
+                <a:alpha val="40000"/>
+              </a:srgbClr>
+            </a:glow>
+            <a:outerShdw blurRad="50800" dist="38100" dir="5400000" algn="t" rotWithShape="0">
+              <a:prstClr val="black">
+                <a:alpha val="40000"/>
+              </a:prstClr>
+            </a:outerShdw>
+          </a:effectLst>
+        </p:spPr>
+        <p:txBody>
+          <a:bodyPr wrap="none" lIns="0" tIns="0" rIns="0" bIns="0" anchor="t"/>
+          <a:lstStyle/>
+          <a:p>
+            <a:pPr algn="ctr">
+              <a:buClr>
+                <a:schemeClr val="bg2"/>
+              </a:buClr>
+              <a:defRPr/>
+            </a:pPr>
+            <a:r>
+              <a:rPr lang="en-US" sz="1400" b="1" dirty="0" smtClean="0">
+                <a:latin typeface="Arial" charset="0"/>
+                <a:cs typeface="Arial" charset="0"/>
+              </a:rPr>
+              <a:t>Business Use Cases</a:t>
+            </a:r>
+            <a:endParaRPr lang="en-US" sz="1400" b="1" dirty="0">
+              <a:solidFill>
+                <a:schemeClr val="tx1"/>
+              </a:solidFill>
+              <a:latin typeface="Arial" charset="0"/>
+              <a:cs typeface="Arial" charset="0"/>
+            </a:endParaRPr>
+          </a:p>
+        </p:txBody>
+      </p:sp>
+      <p:sp>
+        <p:nvSpPr>
+          <p:cNvPr id="7" name="TextBox 6"/>
+          <p:cNvSpPr txBox="1"/>
+          <p:nvPr/>
+        </p:nvSpPr>
+        <p:spPr>
+          <a:xfrm>
+            <a:off x="2438400" y="1143000"/>
+            <a:ext cx="6324600" cy="338554"/>
+          </a:xfrm>
+          <a:prstGeom prst="rect">
+            <a:avLst/>
+          </a:prstGeom>
+        </p:spPr>
+        <p:style>
+          <a:lnRef idx="3">
+            <a:schemeClr val="lt1"/>
+          </a:lnRef>
+          <a:fillRef idx="1">
+            <a:schemeClr val="accent5"/>
+          </a:fillRef>
+          <a:effectRef idx="1">
+            <a:schemeClr val="accent5"/>
+          </a:effectRef>
+          <a:fontRef idx="minor">
+            <a:schemeClr val="lt1"/>
+          </a:fontRef>
+        </p:style>
+        <p:txBody>
+          <a:bodyPr wrap="square" rtlCol="0">
+            <a:spAutoFit/>
+          </a:bodyPr>
+          <a:lstStyle/>
+          <a:p>
+            <a:pPr algn="ctr"/>
+            <a:r>
+              <a:rPr lang="en-AU" sz="1600" dirty="0" smtClean="0"/>
+              <a:t>Business Model</a:t>
+            </a:r>
+            <a:endParaRPr lang="en-AU" sz="1600" dirty="0"/>
+          </a:p>
+        </p:txBody>
+      </p:sp>
+      <p:sp>
+        <p:nvSpPr>
+          <p:cNvPr id="8" name="Rounded Rectangle 7"/>
+          <p:cNvSpPr/>
+          <p:nvPr/>
+        </p:nvSpPr>
+        <p:spPr>
+          <a:xfrm>
+            <a:off x="2667000" y="2438400"/>
+            <a:ext cx="1600200" cy="381000"/>
+          </a:xfrm>
+          <a:prstGeom prst="roundRect">
+            <a:avLst/>
+          </a:prstGeom>
+          <a:noFill/>
+          <a:ln w="19050" cap="flat">
+            <a:solidFill>
+              <a:schemeClr val="tx2">
+                <a:lumMod val="60000"/>
+                <a:lumOff val="40000"/>
+              </a:schemeClr>
+            </a:solidFill>
+          </a:ln>
+          <a:effectLst/>
+        </p:spPr>
+        <p:style>
+          <a:lnRef idx="2">
+            <a:schemeClr val="accent1">
+              <a:shade val="50000"/>
+            </a:schemeClr>
+          </a:lnRef>
+          <a:fillRef idx="1">
+            <a:schemeClr val="accent1"/>
+          </a:fillRef>
+          <a:effectRef idx="0">
+            <a:schemeClr val="accent1"/>
+          </a:effectRef>
+          <a:fontRef idx="minor">
+            <a:schemeClr val="lt1"/>
+          </a:fontRef>
+        </p:style>
+        <p:txBody>
+          <a:bodyPr rtlCol="0" anchor="ctr"/>
+          <a:lstStyle/>
+          <a:p>
+            <a:pPr algn="ctr"/>
+            <a:r>
+              <a:rPr lang="en-AU" sz="1400" dirty="0" smtClean="0">
+                <a:solidFill>
+                  <a:schemeClr val="tx1"/>
+                </a:solidFill>
+              </a:rPr>
+              <a:t>Product Mgmt</a:t>
+            </a:r>
+            <a:endParaRPr lang="en-AU" sz="1400" dirty="0">
+              <a:solidFill>
+                <a:schemeClr val="tx1"/>
+              </a:solidFill>
+            </a:endParaRPr>
+          </a:p>
+        </p:txBody>
+      </p:sp>
+      <p:sp>
+        <p:nvSpPr>
+          <p:cNvPr id="10" name="Rounded Rectangle 9"/>
+          <p:cNvSpPr/>
+          <p:nvPr/>
+        </p:nvSpPr>
+        <p:spPr>
+          <a:xfrm>
+            <a:off x="4343400" y="2438400"/>
+            <a:ext cx="1524000" cy="381000"/>
+          </a:xfrm>
+          <a:prstGeom prst="roundRect">
+            <a:avLst/>
+          </a:prstGeom>
+          <a:noFill/>
+          <a:ln w="19050" cap="flat">
+            <a:solidFill>
+              <a:schemeClr val="tx2">
+                <a:lumMod val="60000"/>
+                <a:lumOff val="40000"/>
+              </a:schemeClr>
+            </a:solidFill>
+          </a:ln>
+          <a:effectLst/>
+        </p:spPr>
+        <p:style>
+          <a:lnRef idx="2">
+            <a:schemeClr val="accent1">
+              <a:shade val="50000"/>
+            </a:schemeClr>
+          </a:lnRef>
+          <a:fillRef idx="1">
+            <a:schemeClr val="accent1"/>
+          </a:fillRef>
+          <a:effectRef idx="0">
+            <a:schemeClr val="accent1"/>
+          </a:effectRef>
+          <a:fontRef idx="minor">
+            <a:schemeClr val="lt1"/>
+          </a:fontRef>
+        </p:style>
+        <p:txBody>
+          <a:bodyPr rtlCol="0" anchor="ctr"/>
+          <a:lstStyle/>
+          <a:p>
+            <a:pPr algn="ctr"/>
+            <a:r>
+              <a:rPr lang="en-AU" sz="1400" dirty="0" smtClean="0">
+                <a:solidFill>
+                  <a:schemeClr val="tx1"/>
+                </a:solidFill>
+              </a:rPr>
+              <a:t>Suppliers Mgmt</a:t>
+            </a:r>
+            <a:endParaRPr lang="en-AU" sz="1400" dirty="0">
+              <a:solidFill>
+                <a:schemeClr val="tx1"/>
+              </a:solidFill>
+            </a:endParaRPr>
+          </a:p>
+        </p:txBody>
+      </p:sp>
+      <p:sp>
+        <p:nvSpPr>
+          <p:cNvPr id="11" name="Rounded Rectangle 10"/>
+          <p:cNvSpPr/>
+          <p:nvPr/>
+        </p:nvSpPr>
+        <p:spPr>
+          <a:xfrm>
+            <a:off x="2667000" y="2895600"/>
+            <a:ext cx="1600200" cy="381000"/>
+          </a:xfrm>
+          <a:prstGeom prst="roundRect">
+            <a:avLst/>
+          </a:prstGeom>
+          <a:noFill/>
+          <a:ln w="19050" cap="flat">
+            <a:solidFill>
+              <a:schemeClr val="tx2">
+                <a:lumMod val="60000"/>
+                <a:lumOff val="40000"/>
+              </a:schemeClr>
+            </a:solidFill>
+          </a:ln>
+          <a:effectLst/>
+        </p:spPr>
+        <p:style>
+          <a:lnRef idx="2">
+            <a:schemeClr val="accent1">
+              <a:shade val="50000"/>
+            </a:schemeClr>
+          </a:lnRef>
+          <a:fillRef idx="1">
+            <a:schemeClr val="accent1"/>
+          </a:fillRef>
+          <a:effectRef idx="0">
+            <a:schemeClr val="accent1"/>
+          </a:effectRef>
+          <a:fontRef idx="minor">
+            <a:schemeClr val="lt1"/>
+          </a:fontRef>
+        </p:style>
+        <p:txBody>
+          <a:bodyPr rtlCol="0" anchor="ctr"/>
+          <a:lstStyle/>
+          <a:p>
+            <a:pPr algn="ctr"/>
+            <a:r>
+              <a:rPr lang="en-AU" sz="1400" dirty="0" smtClean="0">
+                <a:solidFill>
+                  <a:schemeClr val="tx1"/>
+                </a:solidFill>
+              </a:rPr>
+              <a:t>Customer Mgmt</a:t>
+            </a:r>
+            <a:endParaRPr lang="en-AU" sz="1400" dirty="0">
+              <a:solidFill>
+                <a:schemeClr val="tx1"/>
+              </a:solidFill>
+            </a:endParaRPr>
+          </a:p>
+        </p:txBody>
+      </p:sp>
+      <p:sp>
+        <p:nvSpPr>
+          <p:cNvPr id="12" name="Rounded Rectangle 11"/>
+          <p:cNvSpPr/>
+          <p:nvPr/>
+        </p:nvSpPr>
+        <p:spPr>
+          <a:xfrm>
+            <a:off x="4343400" y="2895600"/>
+            <a:ext cx="1524000" cy="381000"/>
+          </a:xfrm>
+          <a:prstGeom prst="roundRect">
+            <a:avLst/>
+          </a:prstGeom>
+          <a:noFill/>
+          <a:ln w="19050" cap="flat">
+            <a:solidFill>
+              <a:schemeClr val="tx2">
+                <a:lumMod val="60000"/>
+                <a:lumOff val="40000"/>
+              </a:schemeClr>
+            </a:solidFill>
+          </a:ln>
+          <a:effectLst/>
+        </p:spPr>
+        <p:style>
+          <a:lnRef idx="2">
+            <a:schemeClr val="accent1">
+              <a:shade val="50000"/>
+            </a:schemeClr>
+          </a:lnRef>
+          <a:fillRef idx="1">
+            <a:schemeClr val="accent1"/>
+          </a:fillRef>
+          <a:effectRef idx="0">
+            <a:schemeClr val="accent1"/>
+          </a:effectRef>
+          <a:fontRef idx="minor">
+            <a:schemeClr val="lt1"/>
+          </a:fontRef>
+        </p:style>
+        <p:txBody>
+          <a:bodyPr rtlCol="0" anchor="ctr"/>
+          <a:lstStyle/>
+          <a:p>
+            <a:pPr algn="ctr"/>
+            <a:r>
+              <a:rPr lang="en-AU" sz="1400" dirty="0" smtClean="0">
+                <a:solidFill>
+                  <a:schemeClr val="tx1"/>
+                </a:solidFill>
+              </a:rPr>
+              <a:t>Order Mgmt</a:t>
+            </a:r>
+            <a:endParaRPr lang="en-AU" sz="1400" dirty="0">
+              <a:solidFill>
+                <a:schemeClr val="tx1"/>
+              </a:solidFill>
+            </a:endParaRPr>
+          </a:p>
+        </p:txBody>
+      </p:sp>
+      <p:sp>
+        <p:nvSpPr>
+          <p:cNvPr id="13" name="Rounded Rectangle 12"/>
+          <p:cNvSpPr/>
+          <p:nvPr/>
+        </p:nvSpPr>
+        <p:spPr>
+          <a:xfrm>
+            <a:off x="2667000" y="3352800"/>
+            <a:ext cx="3200400" cy="381000"/>
+          </a:xfrm>
+          <a:prstGeom prst="roundRect">
+            <a:avLst/>
+          </a:prstGeom>
+          <a:noFill/>
+          <a:ln w="19050" cap="flat">
+            <a:solidFill>
+              <a:schemeClr val="tx2">
+                <a:lumMod val="60000"/>
+                <a:lumOff val="40000"/>
+              </a:schemeClr>
+            </a:solidFill>
+          </a:ln>
+          <a:effectLst/>
+        </p:spPr>
+        <p:style>
+          <a:lnRef idx="2">
+            <a:schemeClr val="accent1">
+              <a:shade val="50000"/>
+            </a:schemeClr>
+          </a:lnRef>
+          <a:fillRef idx="1">
+            <a:schemeClr val="accent1"/>
+          </a:fillRef>
+          <a:effectRef idx="0">
+            <a:schemeClr val="accent1"/>
+          </a:effectRef>
+          <a:fontRef idx="minor">
+            <a:schemeClr val="lt1"/>
+          </a:fontRef>
+        </p:style>
+        <p:txBody>
+          <a:bodyPr rtlCol="0" anchor="ctr"/>
+          <a:lstStyle/>
+          <a:p>
+            <a:pPr algn="ctr"/>
+            <a:r>
+              <a:rPr lang="en-AU" sz="1400" dirty="0" smtClean="0">
+                <a:solidFill>
+                  <a:schemeClr val="tx1"/>
+                </a:solidFill>
+              </a:rPr>
+              <a:t>Sales Management</a:t>
+            </a:r>
+            <a:endParaRPr lang="en-AU" sz="1400" dirty="0">
+              <a:solidFill>
+                <a:schemeClr val="tx1"/>
+              </a:solidFill>
+            </a:endParaRPr>
+          </a:p>
+        </p:txBody>
+      </p:sp>
+      <p:sp>
+        <p:nvSpPr>
+          <p:cNvPr id="14" name="Rounded Rectangle 13"/>
+          <p:cNvSpPr/>
+          <p:nvPr/>
+        </p:nvSpPr>
+        <p:spPr>
+          <a:xfrm>
+            <a:off x="2667000" y="3810000"/>
+            <a:ext cx="3200400" cy="381000"/>
+          </a:xfrm>
+          <a:prstGeom prst="roundRect">
+            <a:avLst/>
+          </a:prstGeom>
+          <a:noFill/>
+          <a:ln w="19050" cap="flat">
+            <a:solidFill>
+              <a:schemeClr val="tx2">
+                <a:lumMod val="60000"/>
+                <a:lumOff val="40000"/>
+              </a:schemeClr>
+            </a:solidFill>
+          </a:ln>
+          <a:effectLst/>
+        </p:spPr>
+        <p:style>
+          <a:lnRef idx="2">
+            <a:schemeClr val="accent1">
+              <a:shade val="50000"/>
+            </a:schemeClr>
+          </a:lnRef>
+          <a:fillRef idx="1">
+            <a:schemeClr val="accent1"/>
+          </a:fillRef>
+          <a:effectRef idx="0">
+            <a:schemeClr val="accent1"/>
+          </a:effectRef>
+          <a:fontRef idx="minor">
+            <a:schemeClr val="lt1"/>
+          </a:fontRef>
+        </p:style>
+        <p:txBody>
+          <a:bodyPr rtlCol="0" anchor="ctr"/>
+          <a:lstStyle/>
+          <a:p>
+            <a:pPr algn="ctr"/>
+            <a:r>
+              <a:rPr lang="en-AU" sz="1400" dirty="0" smtClean="0">
+                <a:solidFill>
+                  <a:schemeClr val="tx1"/>
+                </a:solidFill>
+              </a:rPr>
+              <a:t>User Management</a:t>
+            </a:r>
+            <a:endParaRPr lang="en-AU" sz="1400" dirty="0">
+              <a:solidFill>
+                <a:schemeClr val="tx1"/>
+              </a:solidFill>
+            </a:endParaRPr>
+          </a:p>
+        </p:txBody>
+      </p:sp>
+      <p:sp>
+        <p:nvSpPr>
+          <p:cNvPr id="15" name="Rectangle 13"/>
+          <p:cNvSpPr>
+            <a:spLocks noChangeArrowheads="1"/>
+          </p:cNvSpPr>
+          <p:nvPr/>
+        </p:nvSpPr>
+        <p:spPr bwMode="auto">
+          <a:xfrm>
+            <a:off x="6248400" y="1676400"/>
+            <a:ext cx="2667000" cy="2628916"/>
+          </a:xfrm>
+          <a:prstGeom prst="roundRect">
+            <a:avLst/>
+          </a:prstGeom>
+          <a:gradFill>
+            <a:gsLst>
+              <a:gs pos="28000">
+                <a:schemeClr val="bg1"/>
+              </a:gs>
+              <a:gs pos="73000">
+                <a:srgbClr val="DFE2EE"/>
+              </a:gs>
+            </a:gsLst>
+            <a:lin ang="4800000" scaled="0"/>
+          </a:gradFill>
+          <a:ln w="9525" algn="ctr">
+            <a:solidFill>
+              <a:schemeClr val="tx1"/>
+            </a:solidFill>
+            <a:round/>
+            <a:headEnd/>
+            <a:tailEnd/>
+          </a:ln>
+          <a:effectLst>
+            <a:glow rad="63500">
+              <a:srgbClr val="8899A0">
+                <a:alpha val="40000"/>
+              </a:srgbClr>
+            </a:glow>
+            <a:outerShdw blurRad="50800" dist="38100" dir="5400000" algn="t" rotWithShape="0">
+              <a:prstClr val="black">
+                <a:alpha val="40000"/>
+              </a:prstClr>
+            </a:outerShdw>
+          </a:effectLst>
+        </p:spPr>
+        <p:txBody>
+          <a:bodyPr wrap="none" lIns="0" tIns="0" rIns="0" bIns="0" anchor="t"/>
+          <a:lstStyle/>
+          <a:p>
+            <a:pPr algn="ctr">
+              <a:buClr>
+                <a:schemeClr val="bg2"/>
+              </a:buClr>
+              <a:defRPr/>
+            </a:pPr>
+            <a:r>
+              <a:rPr lang="en-US" sz="1400" b="1" dirty="0" smtClean="0">
+                <a:latin typeface="Arial" charset="0"/>
+                <a:cs typeface="Arial" charset="0"/>
+              </a:rPr>
+              <a:t>Integration Platform</a:t>
+            </a:r>
+            <a:endParaRPr lang="en-US" sz="1400" b="1" dirty="0">
+              <a:solidFill>
+                <a:schemeClr val="tx1"/>
+              </a:solidFill>
+              <a:latin typeface="Arial" charset="0"/>
+              <a:cs typeface="Arial" charset="0"/>
+            </a:endParaRPr>
+          </a:p>
+        </p:txBody>
+      </p:sp>
+      <p:sp>
+        <p:nvSpPr>
+          <p:cNvPr id="17" name="Rounded Rectangle 16"/>
+          <p:cNvSpPr/>
+          <p:nvPr/>
+        </p:nvSpPr>
+        <p:spPr>
+          <a:xfrm>
+            <a:off x="6629400" y="2514600"/>
+            <a:ext cx="1981200" cy="304800"/>
+          </a:xfrm>
+          <a:prstGeom prst="roundRect">
+            <a:avLst/>
+          </a:prstGeom>
+          <a:noFill/>
+          <a:ln w="19050" cap="flat">
+            <a:solidFill>
+              <a:schemeClr val="tx2">
+                <a:lumMod val="60000"/>
+                <a:lumOff val="40000"/>
+              </a:schemeClr>
+            </a:solidFill>
+          </a:ln>
+          <a:effectLst/>
+        </p:spPr>
+        <p:style>
+          <a:lnRef idx="2">
+            <a:schemeClr val="accent1">
+              <a:shade val="50000"/>
+            </a:schemeClr>
+          </a:lnRef>
+          <a:fillRef idx="1">
+            <a:schemeClr val="accent1"/>
+          </a:fillRef>
+          <a:effectRef idx="0">
+            <a:schemeClr val="accent1"/>
+          </a:effectRef>
+          <a:fontRef idx="minor">
+            <a:schemeClr val="lt1"/>
+          </a:fontRef>
+        </p:style>
+        <p:txBody>
+          <a:bodyPr rtlCol="0" anchor="ctr"/>
+          <a:lstStyle/>
+          <a:p>
+            <a:pPr algn="ctr"/>
+            <a:r>
+              <a:rPr lang="en-AU" sz="1400" dirty="0" smtClean="0">
+                <a:solidFill>
+                  <a:schemeClr val="tx1"/>
+                </a:solidFill>
+              </a:rPr>
+              <a:t>Facebook.com</a:t>
+            </a:r>
+            <a:endParaRPr lang="en-AU" sz="1400" dirty="0">
+              <a:solidFill>
+                <a:schemeClr val="tx1"/>
+              </a:solidFill>
+            </a:endParaRPr>
+          </a:p>
+        </p:txBody>
+      </p:sp>
+      <p:sp>
+        <p:nvSpPr>
+          <p:cNvPr id="18" name="Rounded Rectangle 17"/>
+          <p:cNvSpPr/>
+          <p:nvPr/>
+        </p:nvSpPr>
+        <p:spPr>
+          <a:xfrm>
+            <a:off x="6629400" y="3657600"/>
+            <a:ext cx="1981200" cy="304800"/>
+          </a:xfrm>
+          <a:prstGeom prst="roundRect">
+            <a:avLst/>
+          </a:prstGeom>
+          <a:noFill/>
+          <a:ln w="19050" cap="flat">
+            <a:solidFill>
+              <a:schemeClr val="tx2">
+                <a:lumMod val="60000"/>
+                <a:lumOff val="40000"/>
+              </a:schemeClr>
+            </a:solidFill>
+          </a:ln>
+          <a:effectLst/>
+        </p:spPr>
+        <p:style>
+          <a:lnRef idx="2">
+            <a:schemeClr val="accent1">
+              <a:shade val="50000"/>
+            </a:schemeClr>
+          </a:lnRef>
+          <a:fillRef idx="1">
+            <a:schemeClr val="accent1"/>
+          </a:fillRef>
+          <a:effectRef idx="0">
+            <a:schemeClr val="accent1"/>
+          </a:effectRef>
+          <a:fontRef idx="minor">
+            <a:schemeClr val="lt1"/>
+          </a:fontRef>
+        </p:style>
+        <p:txBody>
+          <a:bodyPr rtlCol="0" anchor="ctr"/>
+          <a:lstStyle/>
+          <a:p>
+            <a:pPr algn="ctr"/>
+            <a:r>
+              <a:rPr lang="en-AU" sz="1400" dirty="0" smtClean="0">
+                <a:solidFill>
+                  <a:schemeClr val="tx1"/>
+                </a:solidFill>
+              </a:rPr>
+              <a:t>Salesforce.com</a:t>
+            </a:r>
+            <a:endParaRPr lang="en-AU" sz="1400" dirty="0">
+              <a:solidFill>
+                <a:schemeClr val="tx1"/>
+              </a:solidFill>
+            </a:endParaRPr>
+          </a:p>
+        </p:txBody>
+      </p:sp>
+      <p:sp>
+        <p:nvSpPr>
+          <p:cNvPr id="19" name="Rounded Rectangle 18"/>
+          <p:cNvSpPr/>
+          <p:nvPr/>
+        </p:nvSpPr>
+        <p:spPr>
+          <a:xfrm>
+            <a:off x="6629400" y="2209800"/>
+            <a:ext cx="1981200" cy="228600"/>
+          </a:xfrm>
+          <a:prstGeom prst="roundRect">
+            <a:avLst/>
+          </a:prstGeom>
+        </p:spPr>
+        <p:style>
+          <a:lnRef idx="1">
+            <a:schemeClr val="accent5"/>
+          </a:lnRef>
+          <a:fillRef idx="3">
+            <a:schemeClr val="accent5"/>
+          </a:fillRef>
+          <a:effectRef idx="2">
+            <a:schemeClr val="accent5"/>
+          </a:effectRef>
+          <a:fontRef idx="minor">
+            <a:schemeClr val="lt1"/>
+          </a:fontRef>
+        </p:style>
+        <p:txBody>
+          <a:bodyPr rtlCol="0" anchor="ctr"/>
+          <a:lstStyle/>
+          <a:p>
+            <a:r>
+              <a:rPr lang="en-AU" sz="1400" b="1" dirty="0" smtClean="0"/>
+              <a:t>Social Media</a:t>
+            </a:r>
+            <a:endParaRPr lang="en-AU" sz="1400" b="1" dirty="0"/>
+          </a:p>
+        </p:txBody>
+      </p:sp>
+      <p:sp>
+        <p:nvSpPr>
+          <p:cNvPr id="20" name="Rounded Rectangle 19"/>
+          <p:cNvSpPr/>
+          <p:nvPr/>
+        </p:nvSpPr>
+        <p:spPr>
+          <a:xfrm>
+            <a:off x="6629400" y="2895600"/>
+            <a:ext cx="1981200" cy="304800"/>
+          </a:xfrm>
+          <a:prstGeom prst="roundRect">
+            <a:avLst/>
+          </a:prstGeom>
+          <a:noFill/>
+          <a:ln w="19050" cap="flat">
+            <a:solidFill>
+              <a:schemeClr val="tx2">
+                <a:lumMod val="60000"/>
+                <a:lumOff val="40000"/>
+              </a:schemeClr>
+            </a:solidFill>
+          </a:ln>
+          <a:effectLst/>
+        </p:spPr>
+        <p:style>
+          <a:lnRef idx="2">
+            <a:schemeClr val="accent1">
+              <a:shade val="50000"/>
+            </a:schemeClr>
+          </a:lnRef>
+          <a:fillRef idx="1">
+            <a:schemeClr val="accent1"/>
+          </a:fillRef>
+          <a:effectRef idx="0">
+            <a:schemeClr val="accent1"/>
+          </a:effectRef>
+          <a:fontRef idx="minor">
+            <a:schemeClr val="lt1"/>
+          </a:fontRef>
+        </p:style>
+        <p:txBody>
+          <a:bodyPr rtlCol="0" anchor="ctr"/>
+          <a:lstStyle/>
+          <a:p>
+            <a:pPr algn="ctr"/>
+            <a:r>
+              <a:rPr lang="en-AU" sz="1400" dirty="0" smtClean="0">
+                <a:solidFill>
+                  <a:schemeClr val="tx1"/>
+                </a:solidFill>
+              </a:rPr>
+              <a:t>???????</a:t>
+            </a:r>
+            <a:endParaRPr lang="en-AU" sz="1400" dirty="0">
+              <a:solidFill>
+                <a:schemeClr val="tx1"/>
+              </a:solidFill>
+            </a:endParaRPr>
+          </a:p>
+        </p:txBody>
+      </p:sp>
+      <p:sp>
+        <p:nvSpPr>
+          <p:cNvPr id="21" name="Rounded Rectangle 20"/>
+          <p:cNvSpPr/>
+          <p:nvPr/>
+        </p:nvSpPr>
+        <p:spPr>
+          <a:xfrm>
+            <a:off x="6629400" y="3352800"/>
+            <a:ext cx="1981200" cy="228600"/>
+          </a:xfrm>
+          <a:prstGeom prst="roundRect">
+            <a:avLst/>
+          </a:prstGeom>
+        </p:spPr>
+        <p:style>
+          <a:lnRef idx="1">
+            <a:schemeClr val="accent5"/>
+          </a:lnRef>
+          <a:fillRef idx="3">
+            <a:schemeClr val="accent5"/>
+          </a:fillRef>
+          <a:effectRef idx="2">
+            <a:schemeClr val="accent5"/>
+          </a:effectRef>
+          <a:fontRef idx="minor">
+            <a:schemeClr val="lt1"/>
+          </a:fontRef>
+        </p:style>
+        <p:txBody>
+          <a:bodyPr rtlCol="0" anchor="ctr"/>
+          <a:lstStyle/>
+          <a:p>
+            <a:r>
+              <a:rPr lang="en-AU" sz="1400" b="1" dirty="0" smtClean="0"/>
+              <a:t>CRM Integration</a:t>
+            </a:r>
+            <a:endParaRPr lang="en-AU" sz="1400" b="1" dirty="0"/>
+          </a:p>
+        </p:txBody>
+      </p:sp>
+      <p:sp>
+        <p:nvSpPr>
+          <p:cNvPr id="22" name="TextBox 21"/>
+          <p:cNvSpPr txBox="1"/>
+          <p:nvPr/>
+        </p:nvSpPr>
+        <p:spPr>
+          <a:xfrm>
+            <a:off x="76200" y="1143000"/>
+            <a:ext cx="2057400" cy="338554"/>
+          </a:xfrm>
+          <a:prstGeom prst="rect">
+            <a:avLst/>
+          </a:prstGeom>
+        </p:spPr>
+        <p:style>
+          <a:lnRef idx="3">
+            <a:schemeClr val="lt1"/>
+          </a:lnRef>
+          <a:fillRef idx="1">
+            <a:schemeClr val="accent5"/>
+          </a:fillRef>
+          <a:effectRef idx="1">
+            <a:schemeClr val="accent5"/>
+          </a:effectRef>
+          <a:fontRef idx="minor">
+            <a:schemeClr val="lt1"/>
+          </a:fontRef>
+        </p:style>
+        <p:txBody>
+          <a:bodyPr wrap="square" rtlCol="0">
+            <a:spAutoFit/>
+          </a:bodyPr>
+          <a:lstStyle/>
+          <a:p>
+            <a:pPr algn="ctr"/>
+            <a:r>
+              <a:rPr lang="en-AU" sz="1600" dirty="0" smtClean="0"/>
+              <a:t>MIS Model</a:t>
+            </a:r>
+            <a:endParaRPr lang="en-AU" sz="1600" dirty="0"/>
+          </a:p>
+        </p:txBody>
+      </p:sp>
+      <p:sp>
+        <p:nvSpPr>
+          <p:cNvPr id="23" name="Rectangle 13"/>
+          <p:cNvSpPr>
+            <a:spLocks noChangeArrowheads="1"/>
+          </p:cNvSpPr>
+          <p:nvPr/>
+        </p:nvSpPr>
+        <p:spPr bwMode="auto">
+          <a:xfrm>
+            <a:off x="152400" y="1752600"/>
+            <a:ext cx="2057400" cy="2628916"/>
+          </a:xfrm>
+          <a:prstGeom prst="roundRect">
+            <a:avLst/>
+          </a:prstGeom>
+          <a:gradFill>
+            <a:gsLst>
+              <a:gs pos="28000">
+                <a:schemeClr val="bg1"/>
+              </a:gs>
+              <a:gs pos="73000">
+                <a:srgbClr val="DFE2EE"/>
+              </a:gs>
+            </a:gsLst>
+            <a:lin ang="4800000" scaled="0"/>
+          </a:gradFill>
+          <a:ln w="9525" algn="ctr">
+            <a:solidFill>
+              <a:schemeClr val="tx1"/>
+            </a:solidFill>
+            <a:round/>
+            <a:headEnd/>
+            <a:tailEnd/>
+          </a:ln>
+          <a:effectLst>
+            <a:glow rad="63500">
+              <a:srgbClr val="8899A0">
+                <a:alpha val="40000"/>
+              </a:srgbClr>
+            </a:glow>
+            <a:outerShdw blurRad="50800" dist="38100" dir="5400000" algn="t" rotWithShape="0">
+              <a:prstClr val="black">
+                <a:alpha val="40000"/>
+              </a:prstClr>
+            </a:outerShdw>
+          </a:effectLst>
+        </p:spPr>
+        <p:txBody>
+          <a:bodyPr wrap="none" lIns="0" tIns="0" rIns="0" bIns="0" anchor="t"/>
+          <a:lstStyle/>
+          <a:p>
+            <a:pPr algn="ctr">
+              <a:buClr>
+                <a:schemeClr val="bg2"/>
+              </a:buClr>
+              <a:defRPr/>
+            </a:pPr>
+            <a:r>
+              <a:rPr lang="en-US" sz="1400" b="1" dirty="0" smtClean="0">
+                <a:latin typeface="Arial" charset="0"/>
+                <a:cs typeface="Arial" charset="0"/>
+              </a:rPr>
+              <a:t>Management </a:t>
+            </a:r>
+          </a:p>
+          <a:p>
+            <a:pPr algn="ctr">
+              <a:buClr>
+                <a:schemeClr val="bg2"/>
+              </a:buClr>
+              <a:defRPr/>
+            </a:pPr>
+            <a:r>
+              <a:rPr lang="en-US" sz="1400" b="1" dirty="0" smtClean="0">
+                <a:latin typeface="Arial" charset="0"/>
+                <a:cs typeface="Arial" charset="0"/>
+              </a:rPr>
+              <a:t>Information System</a:t>
+            </a:r>
+            <a:endParaRPr lang="en-US" sz="1400" b="1" dirty="0">
+              <a:solidFill>
+                <a:schemeClr val="tx1"/>
+              </a:solidFill>
+              <a:latin typeface="Arial" charset="0"/>
+              <a:cs typeface="Arial" charset="0"/>
+            </a:endParaRPr>
+          </a:p>
+        </p:txBody>
+      </p:sp>
+      <p:sp>
+        <p:nvSpPr>
+          <p:cNvPr id="25" name="Rounded Rectangle 24"/>
+          <p:cNvSpPr/>
+          <p:nvPr/>
+        </p:nvSpPr>
+        <p:spPr>
+          <a:xfrm>
+            <a:off x="304800" y="2438400"/>
+            <a:ext cx="1676400" cy="381000"/>
+          </a:xfrm>
+          <a:prstGeom prst="roundRect">
+            <a:avLst/>
+          </a:prstGeom>
+          <a:noFill/>
+          <a:ln w="19050" cap="flat">
+            <a:solidFill>
+              <a:schemeClr val="tx2">
+                <a:lumMod val="60000"/>
+                <a:lumOff val="40000"/>
+              </a:schemeClr>
+            </a:solidFill>
+          </a:ln>
+          <a:effectLst/>
+        </p:spPr>
+        <p:style>
+          <a:lnRef idx="2">
+            <a:schemeClr val="accent1">
+              <a:shade val="50000"/>
+            </a:schemeClr>
+          </a:lnRef>
+          <a:fillRef idx="1">
+            <a:schemeClr val="accent1"/>
+          </a:fillRef>
+          <a:effectRef idx="0">
+            <a:schemeClr val="accent1"/>
+          </a:effectRef>
+          <a:fontRef idx="minor">
+            <a:schemeClr val="lt1"/>
+          </a:fontRef>
+        </p:style>
+        <p:txBody>
+          <a:bodyPr rtlCol="0" anchor="ctr"/>
+          <a:lstStyle/>
+          <a:p>
+            <a:pPr algn="ctr"/>
+            <a:r>
+              <a:rPr lang="en-AU" sz="1400" dirty="0" smtClean="0">
+                <a:solidFill>
+                  <a:schemeClr val="tx1"/>
+                </a:solidFill>
+              </a:rPr>
+              <a:t>Dashboard Services</a:t>
+            </a:r>
+            <a:endParaRPr lang="en-AU" sz="1400" dirty="0">
+              <a:solidFill>
+                <a:schemeClr val="tx1"/>
+              </a:solidFill>
+            </a:endParaRPr>
+          </a:p>
+        </p:txBody>
+      </p:sp>
+      <p:sp>
+        <p:nvSpPr>
+          <p:cNvPr id="26" name="Rounded Rectangle 25"/>
+          <p:cNvSpPr/>
+          <p:nvPr/>
+        </p:nvSpPr>
+        <p:spPr>
+          <a:xfrm>
+            <a:off x="304800" y="3048000"/>
+            <a:ext cx="1676400" cy="381000"/>
+          </a:xfrm>
+          <a:prstGeom prst="roundRect">
+            <a:avLst/>
+          </a:prstGeom>
+          <a:noFill/>
+          <a:ln w="19050" cap="flat">
+            <a:solidFill>
+              <a:schemeClr val="tx2">
+                <a:lumMod val="60000"/>
+                <a:lumOff val="40000"/>
+              </a:schemeClr>
+            </a:solidFill>
+          </a:ln>
+          <a:effectLst/>
+        </p:spPr>
+        <p:style>
+          <a:lnRef idx="2">
+            <a:schemeClr val="accent1">
+              <a:shade val="50000"/>
+            </a:schemeClr>
+          </a:lnRef>
+          <a:fillRef idx="1">
+            <a:schemeClr val="accent1"/>
+          </a:fillRef>
+          <a:effectRef idx="0">
+            <a:schemeClr val="accent1"/>
+          </a:effectRef>
+          <a:fontRef idx="minor">
+            <a:schemeClr val="lt1"/>
+          </a:fontRef>
+        </p:style>
+        <p:txBody>
+          <a:bodyPr rtlCol="0" anchor="ctr"/>
+          <a:lstStyle/>
+          <a:p>
+            <a:pPr algn="ctr"/>
+            <a:r>
+              <a:rPr lang="en-AU" sz="1400" dirty="0" smtClean="0">
+                <a:solidFill>
+                  <a:schemeClr val="tx1"/>
+                </a:solidFill>
+              </a:rPr>
+              <a:t>Reporting Services</a:t>
+            </a:r>
+            <a:endParaRPr lang="en-AU" sz="1400" dirty="0">
+              <a:solidFill>
+                <a:schemeClr val="tx1"/>
+              </a:solidFill>
+            </a:endParaRPr>
+          </a:p>
+        </p:txBody>
+      </p:sp>
+      <p:sp>
+        <p:nvSpPr>
+          <p:cNvPr id="27" name="Rounded Rectangle 26"/>
+          <p:cNvSpPr/>
+          <p:nvPr/>
+        </p:nvSpPr>
+        <p:spPr>
+          <a:xfrm>
+            <a:off x="304800" y="3733800"/>
+            <a:ext cx="1676400" cy="381000"/>
+          </a:xfrm>
+          <a:prstGeom prst="roundRect">
+            <a:avLst/>
+          </a:prstGeom>
+          <a:noFill/>
+          <a:ln w="19050" cap="flat">
+            <a:solidFill>
+              <a:schemeClr val="tx2">
+                <a:lumMod val="60000"/>
+                <a:lumOff val="40000"/>
+              </a:schemeClr>
+            </a:solidFill>
+          </a:ln>
+          <a:effectLst/>
+        </p:spPr>
+        <p:style>
+          <a:lnRef idx="2">
+            <a:schemeClr val="accent1">
+              <a:shade val="50000"/>
+            </a:schemeClr>
+          </a:lnRef>
+          <a:fillRef idx="1">
+            <a:schemeClr val="accent1"/>
+          </a:fillRef>
+          <a:effectRef idx="0">
+            <a:schemeClr val="accent1"/>
+          </a:effectRef>
+          <a:fontRef idx="minor">
+            <a:schemeClr val="lt1"/>
+          </a:fontRef>
+        </p:style>
+        <p:txBody>
+          <a:bodyPr rtlCol="0" anchor="ctr"/>
+          <a:lstStyle/>
+          <a:p>
+            <a:pPr algn="ctr"/>
+            <a:r>
+              <a:rPr lang="en-AU" sz="1400" dirty="0" smtClean="0">
+                <a:solidFill>
+                  <a:schemeClr val="tx1"/>
+                </a:solidFill>
+              </a:rPr>
+              <a:t>Analytical Services</a:t>
+            </a:r>
+            <a:endParaRPr lang="en-AU" sz="1400" dirty="0">
+              <a:solidFill>
+                <a:schemeClr val="tx1"/>
+              </a:solidFill>
+            </a:endParaRPr>
+          </a:p>
+        </p:txBody>
+      </p:sp>
+      <p:cxnSp>
+        <p:nvCxnSpPr>
+          <p:cNvPr id="29" name="Straight Connector 28"/>
+          <p:cNvCxnSpPr/>
+          <p:nvPr/>
+        </p:nvCxnSpPr>
+        <p:spPr>
+          <a:xfrm>
+            <a:off x="76200" y="990600"/>
+            <a:ext cx="8991600" cy="0"/>
+          </a:xfrm>
+          <a:prstGeom prst="line">
+            <a:avLst/>
+          </a:prstGeom>
+          <a:ln cap="rnd">
+            <a:gradFill>
+              <a:gsLst>
+                <a:gs pos="0">
+                  <a:schemeClr val="accent1">
+                    <a:tint val="66000"/>
+                    <a:satMod val="160000"/>
+                  </a:schemeClr>
+                </a:gs>
+                <a:gs pos="50000">
+                  <a:schemeClr val="accent1">
+                    <a:tint val="44500"/>
+                    <a:satMod val="160000"/>
+                  </a:schemeClr>
+                </a:gs>
+                <a:gs pos="100000">
+                  <a:schemeClr val="accent1">
+                    <a:tint val="23500"/>
+                    <a:satMod val="160000"/>
+                  </a:schemeClr>
+                </a:gs>
+              </a:gsLst>
+              <a:lin ang="5400000" scaled="0"/>
+            </a:gradFill>
+          </a:ln>
+        </p:spPr>
+        <p:style>
+          <a:lnRef idx="3">
+            <a:schemeClr val="accent1"/>
+          </a:lnRef>
+          <a:fillRef idx="0">
+            <a:schemeClr val="accent1"/>
+          </a:fillRef>
+          <a:effectRef idx="2">
+            <a:schemeClr val="accent1"/>
+          </a:effectRef>
+          <a:fontRef idx="minor">
+            <a:schemeClr val="tx1"/>
+          </a:fontRef>
+        </p:style>
+      </p:cxnSp>
+      <p:cxnSp>
+        <p:nvCxnSpPr>
+          <p:cNvPr id="31" name="Straight Connector 30"/>
+          <p:cNvCxnSpPr/>
+          <p:nvPr/>
+        </p:nvCxnSpPr>
+        <p:spPr>
+          <a:xfrm>
+            <a:off x="76200" y="4648200"/>
+            <a:ext cx="8991600" cy="0"/>
+          </a:xfrm>
+          <a:prstGeom prst="line">
+            <a:avLst/>
+          </a:prstGeom>
+          <a:ln cap="rnd">
+            <a:gradFill>
+              <a:gsLst>
+                <a:gs pos="0">
+                  <a:schemeClr val="accent1">
+                    <a:tint val="66000"/>
+                    <a:satMod val="160000"/>
+                  </a:schemeClr>
+                </a:gs>
+                <a:gs pos="50000">
+                  <a:schemeClr val="accent1">
+                    <a:tint val="44500"/>
+                    <a:satMod val="160000"/>
+                  </a:schemeClr>
+                </a:gs>
+                <a:gs pos="100000">
+                  <a:schemeClr val="accent1">
+                    <a:tint val="23500"/>
+                    <a:satMod val="160000"/>
+                  </a:schemeClr>
+                </a:gs>
+              </a:gsLst>
+              <a:lin ang="5400000" scaled="0"/>
+            </a:gradFill>
+          </a:ln>
+        </p:spPr>
+        <p:style>
+          <a:lnRef idx="3">
+            <a:schemeClr val="accent1"/>
+          </a:lnRef>
+          <a:fillRef idx="0">
+            <a:schemeClr val="accent1"/>
+          </a:fillRef>
+          <a:effectRef idx="2">
+            <a:schemeClr val="accent1"/>
+          </a:effectRef>
+          <a:fontRef idx="minor">
+            <a:schemeClr val="tx1"/>
+          </a:fontRef>
+        </p:style>
+      </p:cxnSp>
+    </p:spTree>
+  </p:cSld>
+  <p:clrMapOvr>
+    <a:masterClrMapping/>
+  </p:clrMapOvr>
+</p:sld>
+</file>
+
+<file path=ppt/slides/slide3.xml><?xml version="1.0" encoding="utf-8"?>
+<p:sld xmlns:a="http://schemas.openxmlformats.org/drawingml/2006/main" xmlns:r="http://schemas.openxmlformats.org/officeDocument/2006/relationships" xmlns:p="http://schemas.openxmlformats.org/presentationml/2006/main">
+  <p:cSld>
+    <p:spTree>
+      <p:nvGrpSpPr>
+        <p:cNvPr id="1" name=""/>
+        <p:cNvGrpSpPr/>
+        <p:nvPr/>
+      </p:nvGrpSpPr>
+      <p:grpSpPr>
+        <a:xfrm>
+          <a:off x="0" y="0"/>
+          <a:ext cx="0" cy="0"/>
+          <a:chOff x="0" y="0"/>
+          <a:chExt cx="0" cy="0"/>
+        </a:xfrm>
+      </p:grpSpPr>
+      <p:sp>
+        <p:nvSpPr>
           <p:cNvPr id="27" name="Rectangle 26"/>
           <p:cNvSpPr/>
           <p:nvPr/>
@@ -3361,7 +4696,7 @@
         <p:spPr>
           <a:xfrm>
             <a:off x="0" y="457200"/>
-            <a:ext cx="5105400" cy="381000"/>
+            <a:ext cx="5715000" cy="381000"/>
           </a:xfrm>
         </p:spPr>
         <p:style>
@@ -3387,7 +4722,15 @@
             <a:pPr algn="l"/>
             <a:r>
               <a:rPr lang="en-US" sz="2000" b="1" dirty="0" smtClean="0"/>
-              <a:t>High Level System Context &amp; Deployment Model</a:t>
+              <a:t>High Level </a:t>
+            </a:r>
+            <a:r>
+              <a:rPr lang="en-US" sz="2000" b="1" dirty="0" smtClean="0"/>
+              <a:t>Technical Architecture &amp; </a:t>
+            </a:r>
+            <a:r>
+              <a:rPr lang="en-US" sz="2000" b="1" dirty="0" smtClean="0"/>
+              <a:t>Deployment Model</a:t>
             </a:r>
             <a:endParaRPr lang="en-US" sz="2000" b="1" dirty="0"/>
           </a:p>

</xml_diff>

<commit_message>
1. Redux Included 2. Store, Actions 3. Location 4. Browser Sync - Added Gulp Task
</commit_message>
<xml_diff>
--- a/OrderManagement/MultiProjectSample/Content/images/System Context.pptx
+++ b/OrderManagement/MultiProjectSample/Content/images/System Context.pptx
@@ -7,7 +7,8 @@
   <p:sldIdLst>
     <p:sldId id="256" r:id="rId2"/>
     <p:sldId id="268" r:id="rId3"/>
-    <p:sldId id="267" r:id="rId4"/>
+    <p:sldId id="269" r:id="rId4"/>
+    <p:sldId id="267" r:id="rId5"/>
   </p:sldIdLst>
   <p:sldSz cx="9144000" cy="6858000" type="screen4x3"/>
   <p:notesSz cx="6858000" cy="9144000"/>
@@ -291,7 +292,7 @@
             <a:fld id="{A81FE3E5-8971-4F75-A2CB-6C5A4E3E921D}" type="datetimeFigureOut">
               <a:rPr lang="en-US" smtClean="0"/>
               <a:pPr/>
-              <a:t>5/19/2017</a:t>
+              <a:t>6/23/2017</a:t>
             </a:fld>
             <a:endParaRPr lang="en-US"/>
           </a:p>
@@ -458,7 +459,7 @@
             <a:fld id="{A81FE3E5-8971-4F75-A2CB-6C5A4E3E921D}" type="datetimeFigureOut">
               <a:rPr lang="en-US" smtClean="0"/>
               <a:pPr/>
-              <a:t>5/19/2017</a:t>
+              <a:t>6/23/2017</a:t>
             </a:fld>
             <a:endParaRPr lang="en-US"/>
           </a:p>
@@ -635,7 +636,7 @@
             <a:fld id="{A81FE3E5-8971-4F75-A2CB-6C5A4E3E921D}" type="datetimeFigureOut">
               <a:rPr lang="en-US" smtClean="0"/>
               <a:pPr/>
-              <a:t>5/19/2017</a:t>
+              <a:t>6/23/2017</a:t>
             </a:fld>
             <a:endParaRPr lang="en-US"/>
           </a:p>
@@ -802,7 +803,7 @@
             <a:fld id="{A81FE3E5-8971-4F75-A2CB-6C5A4E3E921D}" type="datetimeFigureOut">
               <a:rPr lang="en-US" smtClean="0"/>
               <a:pPr/>
-              <a:t>5/19/2017</a:t>
+              <a:t>6/23/2017</a:t>
             </a:fld>
             <a:endParaRPr lang="en-US"/>
           </a:p>
@@ -1045,7 +1046,7 @@
             <a:fld id="{A81FE3E5-8971-4F75-A2CB-6C5A4E3E921D}" type="datetimeFigureOut">
               <a:rPr lang="en-US" smtClean="0"/>
               <a:pPr/>
-              <a:t>5/19/2017</a:t>
+              <a:t>6/23/2017</a:t>
             </a:fld>
             <a:endParaRPr lang="en-US"/>
           </a:p>
@@ -1330,7 +1331,7 @@
             <a:fld id="{A81FE3E5-8971-4F75-A2CB-6C5A4E3E921D}" type="datetimeFigureOut">
               <a:rPr lang="en-US" smtClean="0"/>
               <a:pPr/>
-              <a:t>5/19/2017</a:t>
+              <a:t>6/23/2017</a:t>
             </a:fld>
             <a:endParaRPr lang="en-US"/>
           </a:p>
@@ -1749,7 +1750,7 @@
             <a:fld id="{A81FE3E5-8971-4F75-A2CB-6C5A4E3E921D}" type="datetimeFigureOut">
               <a:rPr lang="en-US" smtClean="0"/>
               <a:pPr/>
-              <a:t>5/19/2017</a:t>
+              <a:t>6/23/2017</a:t>
             </a:fld>
             <a:endParaRPr lang="en-US"/>
           </a:p>
@@ -1864,7 +1865,7 @@
             <a:fld id="{A81FE3E5-8971-4F75-A2CB-6C5A4E3E921D}" type="datetimeFigureOut">
               <a:rPr lang="en-US" smtClean="0"/>
               <a:pPr/>
-              <a:t>5/19/2017</a:t>
+              <a:t>6/23/2017</a:t>
             </a:fld>
             <a:endParaRPr lang="en-US"/>
           </a:p>
@@ -1956,7 +1957,7 @@
             <a:fld id="{A81FE3E5-8971-4F75-A2CB-6C5A4E3E921D}" type="datetimeFigureOut">
               <a:rPr lang="en-US" smtClean="0"/>
               <a:pPr/>
-              <a:t>5/19/2017</a:t>
+              <a:t>6/23/2017</a:t>
             </a:fld>
             <a:endParaRPr lang="en-US"/>
           </a:p>
@@ -2230,7 +2231,7 @@
             <a:fld id="{A81FE3E5-8971-4F75-A2CB-6C5A4E3E921D}" type="datetimeFigureOut">
               <a:rPr lang="en-US" smtClean="0"/>
               <a:pPr/>
-              <a:t>5/19/2017</a:t>
+              <a:t>6/23/2017</a:t>
             </a:fld>
             <a:endParaRPr lang="en-US"/>
           </a:p>
@@ -2480,7 +2481,7 @@
             <a:fld id="{A81FE3E5-8971-4F75-A2CB-6C5A4E3E921D}" type="datetimeFigureOut">
               <a:rPr lang="en-US" smtClean="0"/>
               <a:pPr/>
-              <a:t>5/19/2017</a:t>
+              <a:t>6/23/2017</a:t>
             </a:fld>
             <a:endParaRPr lang="en-US"/>
           </a:p>
@@ -2690,7 +2691,7 @@
             <a:fld id="{A81FE3E5-8971-4F75-A2CB-6C5A4E3E921D}" type="datetimeFigureOut">
               <a:rPr lang="en-US" smtClean="0"/>
               <a:pPr/>
-              <a:t>5/19/2017</a:t>
+              <a:t>6/23/2017</a:t>
             </a:fld>
             <a:endParaRPr lang="en-US"/>
           </a:p>
@@ -4475,6 +4476,962 @@
       </p:grpSpPr>
       <p:sp>
         <p:nvSpPr>
+          <p:cNvPr id="3" name="Content Placeholder 2"/>
+          <p:cNvSpPr>
+            <a:spLocks noGrp="1"/>
+          </p:cNvSpPr>
+          <p:nvPr>
+            <p:ph idx="1"/>
+          </p:nvPr>
+        </p:nvSpPr>
+        <p:spPr>
+          <a:xfrm>
+            <a:off x="152400" y="1524000"/>
+            <a:ext cx="2895600" cy="2133600"/>
+          </a:xfrm>
+          <a:ln/>
+        </p:spPr>
+        <p:style>
+          <a:lnRef idx="2">
+            <a:schemeClr val="accent1"/>
+          </a:lnRef>
+          <a:fillRef idx="1">
+            <a:schemeClr val="lt1"/>
+          </a:fillRef>
+          <a:effectRef idx="0">
+            <a:schemeClr val="accent1"/>
+          </a:effectRef>
+          <a:fontRef idx="minor">
+            <a:schemeClr val="dk1"/>
+          </a:fontRef>
+        </p:style>
+        <p:txBody>
+          <a:bodyPr>
+            <a:normAutofit/>
+          </a:bodyPr>
+          <a:lstStyle/>
+          <a:p>
+            <a:r>
+              <a:rPr lang="en-AU" sz="1400" dirty="0" smtClean="0"/>
+              <a:t>Singe Page Application</a:t>
+            </a:r>
+          </a:p>
+          <a:p>
+            <a:r>
+              <a:rPr lang="en-AU" sz="1400" dirty="0" smtClean="0"/>
+              <a:t>Responsive Design</a:t>
+            </a:r>
+          </a:p>
+          <a:p>
+            <a:r>
+              <a:rPr lang="en-AU" sz="1400" dirty="0" smtClean="0"/>
+              <a:t>Modular Approach</a:t>
+            </a:r>
+          </a:p>
+          <a:p>
+            <a:r>
+              <a:rPr lang="en-AU" sz="1400" dirty="0" smtClean="0"/>
+              <a:t>Service Oriented Architecture</a:t>
+            </a:r>
+          </a:p>
+          <a:p>
+            <a:r>
+              <a:rPr lang="en-AU" sz="1400" dirty="0" smtClean="0"/>
+              <a:t>Database First Approach</a:t>
+            </a:r>
+          </a:p>
+          <a:p>
+            <a:endParaRPr lang="en-AU" sz="1400" dirty="0"/>
+          </a:p>
+        </p:txBody>
+      </p:sp>
+      <p:sp>
+        <p:nvSpPr>
+          <p:cNvPr id="4" name="Title 1"/>
+          <p:cNvSpPr>
+            <a:spLocks noGrp="1"/>
+          </p:cNvSpPr>
+          <p:nvPr>
+            <p:ph type="title"/>
+          </p:nvPr>
+        </p:nvSpPr>
+        <p:spPr>
+          <a:xfrm>
+            <a:off x="0" y="457200"/>
+            <a:ext cx="5105400" cy="381000"/>
+          </a:xfrm>
+        </p:spPr>
+        <p:style>
+          <a:lnRef idx="3">
+            <a:schemeClr val="lt1"/>
+          </a:lnRef>
+          <a:fillRef idx="1">
+            <a:schemeClr val="accent1"/>
+          </a:fillRef>
+          <a:effectRef idx="1">
+            <a:schemeClr val="accent1"/>
+          </a:effectRef>
+          <a:fontRef idx="minor">
+            <a:schemeClr val="lt1"/>
+          </a:fontRef>
+        </p:style>
+        <p:txBody>
+          <a:bodyPr>
+            <a:normAutofit fontScale="90000"/>
+          </a:bodyPr>
+          <a:lstStyle/>
+          <a:p>
+            <a:pPr algn="l"/>
+            <a:r>
+              <a:rPr lang="en-US" sz="2000" b="1" dirty="0" smtClean="0"/>
+              <a:t>Application Best Practices</a:t>
+            </a:r>
+            <a:endParaRPr lang="en-US" sz="2000" b="1" dirty="0"/>
+          </a:p>
+        </p:txBody>
+      </p:sp>
+      <p:sp>
+        <p:nvSpPr>
+          <p:cNvPr id="5" name="Rounded Rectangle 4"/>
+          <p:cNvSpPr/>
+          <p:nvPr/>
+        </p:nvSpPr>
+        <p:spPr>
+          <a:xfrm>
+            <a:off x="152400" y="1143000"/>
+            <a:ext cx="2895600" cy="381000"/>
+          </a:xfrm>
+          <a:prstGeom prst="roundRect">
+            <a:avLst/>
+          </a:prstGeom>
+        </p:spPr>
+        <p:style>
+          <a:lnRef idx="2">
+            <a:schemeClr val="accent1">
+              <a:shade val="50000"/>
+            </a:schemeClr>
+          </a:lnRef>
+          <a:fillRef idx="1">
+            <a:schemeClr val="accent1"/>
+          </a:fillRef>
+          <a:effectRef idx="0">
+            <a:schemeClr val="accent1"/>
+          </a:effectRef>
+          <a:fontRef idx="minor">
+            <a:schemeClr val="lt1"/>
+          </a:fontRef>
+        </p:style>
+        <p:txBody>
+          <a:bodyPr rtlCol="0" anchor="ctr"/>
+          <a:lstStyle/>
+          <a:p>
+            <a:pPr algn="ctr"/>
+            <a:r>
+              <a:rPr lang="en-AU" dirty="0" smtClean="0"/>
+              <a:t>Design Principles</a:t>
+            </a:r>
+            <a:endParaRPr lang="en-AU" dirty="0"/>
+          </a:p>
+        </p:txBody>
+      </p:sp>
+      <p:sp>
+        <p:nvSpPr>
+          <p:cNvPr id="6" name="Rounded Rectangle 5"/>
+          <p:cNvSpPr/>
+          <p:nvPr/>
+        </p:nvSpPr>
+        <p:spPr>
+          <a:xfrm>
+            <a:off x="3124200" y="1143000"/>
+            <a:ext cx="2895600" cy="381000"/>
+          </a:xfrm>
+          <a:prstGeom prst="roundRect">
+            <a:avLst/>
+          </a:prstGeom>
+        </p:spPr>
+        <p:style>
+          <a:lnRef idx="2">
+            <a:schemeClr val="accent1">
+              <a:shade val="50000"/>
+            </a:schemeClr>
+          </a:lnRef>
+          <a:fillRef idx="1">
+            <a:schemeClr val="accent1"/>
+          </a:fillRef>
+          <a:effectRef idx="0">
+            <a:schemeClr val="accent1"/>
+          </a:effectRef>
+          <a:fontRef idx="minor">
+            <a:schemeClr val="lt1"/>
+          </a:fontRef>
+        </p:style>
+        <p:txBody>
+          <a:bodyPr rtlCol="0" anchor="ctr"/>
+          <a:lstStyle/>
+          <a:p>
+            <a:pPr algn="ctr"/>
+            <a:r>
+              <a:rPr lang="en-AU" dirty="0" smtClean="0"/>
+              <a:t>Technology Stack</a:t>
+            </a:r>
+            <a:endParaRPr lang="en-AU" dirty="0" smtClean="0"/>
+          </a:p>
+        </p:txBody>
+      </p:sp>
+      <p:sp>
+        <p:nvSpPr>
+          <p:cNvPr id="7" name="Rounded Rectangle 6"/>
+          <p:cNvSpPr/>
+          <p:nvPr/>
+        </p:nvSpPr>
+        <p:spPr>
+          <a:xfrm>
+            <a:off x="6096000" y="1143000"/>
+            <a:ext cx="2895600" cy="381000"/>
+          </a:xfrm>
+          <a:prstGeom prst="roundRect">
+            <a:avLst/>
+          </a:prstGeom>
+        </p:spPr>
+        <p:style>
+          <a:lnRef idx="2">
+            <a:schemeClr val="accent1">
+              <a:shade val="50000"/>
+            </a:schemeClr>
+          </a:lnRef>
+          <a:fillRef idx="1">
+            <a:schemeClr val="accent1"/>
+          </a:fillRef>
+          <a:effectRef idx="0">
+            <a:schemeClr val="accent1"/>
+          </a:effectRef>
+          <a:fontRef idx="minor">
+            <a:schemeClr val="lt1"/>
+          </a:fontRef>
+        </p:style>
+        <p:txBody>
+          <a:bodyPr rtlCol="0" anchor="ctr"/>
+          <a:lstStyle/>
+          <a:p>
+            <a:pPr algn="ctr"/>
+            <a:r>
+              <a:rPr lang="en-AU" dirty="0" smtClean="0"/>
+              <a:t>Platform Integration</a:t>
+            </a:r>
+            <a:endParaRPr lang="en-AU" dirty="0"/>
+          </a:p>
+        </p:txBody>
+      </p:sp>
+      <p:sp>
+        <p:nvSpPr>
+          <p:cNvPr id="10" name="Rectangle 9"/>
+          <p:cNvSpPr/>
+          <p:nvPr/>
+        </p:nvSpPr>
+        <p:spPr>
+          <a:xfrm>
+            <a:off x="3124200" y="1524000"/>
+            <a:ext cx="2895600" cy="2133600"/>
+          </a:xfrm>
+          <a:prstGeom prst="rect">
+            <a:avLst/>
+          </a:prstGeom>
+          <a:ln/>
+        </p:spPr>
+        <p:style>
+          <a:lnRef idx="2">
+            <a:schemeClr val="accent1"/>
+          </a:lnRef>
+          <a:fillRef idx="1">
+            <a:schemeClr val="lt1"/>
+          </a:fillRef>
+          <a:effectRef idx="0">
+            <a:schemeClr val="accent1"/>
+          </a:effectRef>
+          <a:fontRef idx="minor">
+            <a:schemeClr val="dk1"/>
+          </a:fontRef>
+        </p:style>
+        <p:txBody>
+          <a:bodyPr vert="horz" lIns="91440" tIns="45720" rIns="91440" bIns="45720" rtlCol="0">
+            <a:normAutofit/>
+          </a:bodyPr>
+          <a:lstStyle/>
+          <a:p>
+            <a:pPr marL="342900" indent="-342900">
+              <a:spcBef>
+                <a:spcPct val="20000"/>
+              </a:spcBef>
+              <a:buFont typeface="Arial" pitchFamily="34" charset="0"/>
+              <a:buChar char="•"/>
+            </a:pPr>
+            <a:r>
+              <a:rPr lang="en-AU" sz="1400" dirty="0" smtClean="0"/>
+              <a:t>Angular 2 + TypeScript for SPA</a:t>
+            </a:r>
+          </a:p>
+          <a:p>
+            <a:pPr marL="342900" indent="-342900">
+              <a:spcBef>
+                <a:spcPct val="20000"/>
+              </a:spcBef>
+              <a:buFont typeface="Arial" pitchFamily="34" charset="0"/>
+              <a:buChar char="•"/>
+            </a:pPr>
+            <a:r>
+              <a:rPr lang="en-AU" sz="1400" dirty="0" err="1" smtClean="0"/>
+              <a:t>Redux</a:t>
+            </a:r>
+            <a:r>
+              <a:rPr lang="en-AU" sz="1400" dirty="0" smtClean="0"/>
+              <a:t> for State Management</a:t>
+            </a:r>
+          </a:p>
+          <a:p>
+            <a:pPr marL="342900" indent="-342900">
+              <a:spcBef>
+                <a:spcPct val="20000"/>
+              </a:spcBef>
+              <a:buFont typeface="Arial" pitchFamily="34" charset="0"/>
+              <a:buChar char="•"/>
+            </a:pPr>
+            <a:r>
+              <a:rPr lang="en-AU" sz="1400" dirty="0" smtClean="0"/>
+              <a:t>Bootstrap 3.0, SASS</a:t>
+            </a:r>
+          </a:p>
+          <a:p>
+            <a:pPr marL="342900" indent="-342900">
+              <a:spcBef>
+                <a:spcPct val="20000"/>
+              </a:spcBef>
+              <a:buFont typeface="Arial" pitchFamily="34" charset="0"/>
+              <a:buChar char="•"/>
+            </a:pPr>
+            <a:r>
+              <a:rPr lang="en-AU" sz="1400" dirty="0" smtClean="0"/>
+              <a:t>Castle Windsor for DI</a:t>
+            </a:r>
+          </a:p>
+          <a:p>
+            <a:pPr marL="342900" indent="-342900">
+              <a:spcBef>
+                <a:spcPct val="20000"/>
+              </a:spcBef>
+              <a:buFont typeface="Arial" pitchFamily="34" charset="0"/>
+              <a:buChar char="•"/>
+            </a:pPr>
+            <a:r>
+              <a:rPr lang="en-AU" sz="1400" dirty="0" smtClean="0"/>
+              <a:t>AutoMapper for mapping</a:t>
+            </a:r>
+          </a:p>
+          <a:p>
+            <a:pPr marL="342900" indent="-342900">
+              <a:spcBef>
+                <a:spcPct val="20000"/>
+              </a:spcBef>
+              <a:buFont typeface="Arial" pitchFamily="34" charset="0"/>
+              <a:buChar char="•"/>
+            </a:pPr>
+            <a:r>
+              <a:rPr lang="en-AU" sz="1400" dirty="0" smtClean="0"/>
+              <a:t>Web API 2.0 - API Development</a:t>
+            </a:r>
+          </a:p>
+          <a:p>
+            <a:pPr marL="342900" indent="-342900">
+              <a:spcBef>
+                <a:spcPct val="20000"/>
+              </a:spcBef>
+              <a:buFont typeface="Arial" pitchFamily="34" charset="0"/>
+              <a:buChar char="•"/>
+            </a:pPr>
+            <a:r>
+              <a:rPr lang="en-AU" sz="1400" dirty="0" smtClean="0"/>
+              <a:t>Entity Framework 6.0</a:t>
+            </a:r>
+          </a:p>
+          <a:p>
+            <a:pPr marL="342900" indent="-342900">
+              <a:spcBef>
+                <a:spcPct val="20000"/>
+              </a:spcBef>
+              <a:buFont typeface="Arial" pitchFamily="34" charset="0"/>
+              <a:buChar char="•"/>
+            </a:pPr>
+            <a:r>
+              <a:rPr lang="en-AU" sz="1400" dirty="0" smtClean="0"/>
+              <a:t>SQL Server 2014 Database</a:t>
+            </a:r>
+          </a:p>
+        </p:txBody>
+      </p:sp>
+      <p:sp>
+        <p:nvSpPr>
+          <p:cNvPr id="11" name="Rectangle 10"/>
+          <p:cNvSpPr/>
+          <p:nvPr/>
+        </p:nvSpPr>
+        <p:spPr>
+          <a:xfrm>
+            <a:off x="6096000" y="1524000"/>
+            <a:ext cx="2895600" cy="2133600"/>
+          </a:xfrm>
+          <a:prstGeom prst="rect">
+            <a:avLst/>
+          </a:prstGeom>
+          <a:ln/>
+        </p:spPr>
+        <p:style>
+          <a:lnRef idx="2">
+            <a:schemeClr val="accent1"/>
+          </a:lnRef>
+          <a:fillRef idx="1">
+            <a:schemeClr val="lt1"/>
+          </a:fillRef>
+          <a:effectRef idx="0">
+            <a:schemeClr val="accent1"/>
+          </a:effectRef>
+          <a:fontRef idx="minor">
+            <a:schemeClr val="dk1"/>
+          </a:fontRef>
+        </p:style>
+        <p:txBody>
+          <a:bodyPr vert="horz" lIns="91440" tIns="45720" rIns="91440" bIns="45720" rtlCol="0">
+            <a:normAutofit/>
+          </a:bodyPr>
+          <a:lstStyle/>
+          <a:p>
+            <a:pPr marL="342900" indent="-342900">
+              <a:spcBef>
+                <a:spcPct val="20000"/>
+              </a:spcBef>
+              <a:buFont typeface="Arial" pitchFamily="34" charset="0"/>
+              <a:buChar char="•"/>
+            </a:pPr>
+            <a:r>
+              <a:rPr lang="en-AU" sz="1400" dirty="0" smtClean="0"/>
+              <a:t>API Integration</a:t>
+            </a:r>
+          </a:p>
+          <a:p>
+            <a:pPr marL="342900" indent="-342900">
+              <a:spcBef>
+                <a:spcPct val="20000"/>
+              </a:spcBef>
+              <a:buFont typeface="Arial" pitchFamily="34" charset="0"/>
+              <a:buChar char="•"/>
+            </a:pPr>
+            <a:r>
+              <a:rPr lang="en-AU" sz="1400" dirty="0" smtClean="0"/>
+              <a:t>Integration with Salesforce.com</a:t>
+            </a:r>
+          </a:p>
+          <a:p>
+            <a:pPr marL="342900" indent="-342900">
+              <a:spcBef>
+                <a:spcPct val="20000"/>
+              </a:spcBef>
+              <a:buFont typeface="Arial" pitchFamily="34" charset="0"/>
+              <a:buChar char="•"/>
+            </a:pPr>
+            <a:r>
+              <a:rPr lang="en-AU" sz="1400" dirty="0" smtClean="0"/>
+              <a:t>Integration with Google Maps API</a:t>
+            </a:r>
+          </a:p>
+          <a:p>
+            <a:pPr marL="342900" indent="-342900">
+              <a:spcBef>
+                <a:spcPct val="20000"/>
+              </a:spcBef>
+              <a:buFont typeface="Arial" pitchFamily="34" charset="0"/>
+              <a:buChar char="•"/>
+            </a:pPr>
+            <a:r>
+              <a:rPr lang="en-AU" sz="1400" dirty="0" smtClean="0"/>
+              <a:t>Exposing Application API’s</a:t>
+            </a:r>
+          </a:p>
+          <a:p>
+            <a:pPr marL="342900" indent="-342900">
+              <a:spcBef>
+                <a:spcPct val="20000"/>
+              </a:spcBef>
+              <a:buFont typeface="Arial" pitchFamily="34" charset="0"/>
+              <a:buChar char="•"/>
+            </a:pPr>
+            <a:r>
+              <a:rPr lang="en-AU" sz="1400" dirty="0" smtClean="0"/>
+              <a:t>Integrated Security enabled on all API’s</a:t>
+            </a:r>
+          </a:p>
+          <a:p>
+            <a:pPr marL="342900" indent="-342900">
+              <a:spcBef>
+                <a:spcPct val="20000"/>
+              </a:spcBef>
+              <a:buFont typeface="Arial" pitchFamily="34" charset="0"/>
+              <a:buChar char="•"/>
+            </a:pPr>
+            <a:endParaRPr lang="en-AU" sz="1400" dirty="0" smtClean="0"/>
+          </a:p>
+        </p:txBody>
+      </p:sp>
+      <p:sp>
+        <p:nvSpPr>
+          <p:cNvPr id="12" name="Rounded Rectangle 11"/>
+          <p:cNvSpPr/>
+          <p:nvPr/>
+        </p:nvSpPr>
+        <p:spPr>
+          <a:xfrm>
+            <a:off x="3124200" y="4038600"/>
+            <a:ext cx="2895600" cy="381000"/>
+          </a:xfrm>
+          <a:prstGeom prst="roundRect">
+            <a:avLst/>
+          </a:prstGeom>
+        </p:spPr>
+        <p:style>
+          <a:lnRef idx="2">
+            <a:schemeClr val="accent1">
+              <a:shade val="50000"/>
+            </a:schemeClr>
+          </a:lnRef>
+          <a:fillRef idx="1">
+            <a:schemeClr val="accent1"/>
+          </a:fillRef>
+          <a:effectRef idx="0">
+            <a:schemeClr val="accent1"/>
+          </a:effectRef>
+          <a:fontRef idx="minor">
+            <a:schemeClr val="lt1"/>
+          </a:fontRef>
+        </p:style>
+        <p:txBody>
+          <a:bodyPr rtlCol="0" anchor="ctr"/>
+          <a:lstStyle/>
+          <a:p>
+            <a:pPr algn="ctr"/>
+            <a:r>
+              <a:rPr lang="en-AU" dirty="0" smtClean="0"/>
+              <a:t>Social Networking</a:t>
+            </a:r>
+            <a:endParaRPr lang="en-AU" dirty="0" smtClean="0"/>
+          </a:p>
+        </p:txBody>
+      </p:sp>
+      <p:sp>
+        <p:nvSpPr>
+          <p:cNvPr id="13" name="Rounded Rectangle 12"/>
+          <p:cNvSpPr/>
+          <p:nvPr/>
+        </p:nvSpPr>
+        <p:spPr>
+          <a:xfrm>
+            <a:off x="6096000" y="4038600"/>
+            <a:ext cx="2895600" cy="381000"/>
+          </a:xfrm>
+          <a:prstGeom prst="roundRect">
+            <a:avLst/>
+          </a:prstGeom>
+        </p:spPr>
+        <p:style>
+          <a:lnRef idx="2">
+            <a:schemeClr val="accent1">
+              <a:shade val="50000"/>
+            </a:schemeClr>
+          </a:lnRef>
+          <a:fillRef idx="1">
+            <a:schemeClr val="accent1"/>
+          </a:fillRef>
+          <a:effectRef idx="0">
+            <a:schemeClr val="accent1"/>
+          </a:effectRef>
+          <a:fontRef idx="minor">
+            <a:schemeClr val="lt1"/>
+          </a:fontRef>
+        </p:style>
+        <p:txBody>
+          <a:bodyPr rtlCol="0" anchor="ctr"/>
+          <a:lstStyle/>
+          <a:p>
+            <a:pPr algn="ctr"/>
+            <a:r>
+              <a:rPr lang="en-AU" dirty="0" smtClean="0"/>
+              <a:t>Cloud Technology</a:t>
+            </a:r>
+            <a:endParaRPr lang="en-AU" dirty="0"/>
+          </a:p>
+        </p:txBody>
+      </p:sp>
+      <p:sp>
+        <p:nvSpPr>
+          <p:cNvPr id="14" name="Rectangle 13"/>
+          <p:cNvSpPr/>
+          <p:nvPr/>
+        </p:nvSpPr>
+        <p:spPr>
+          <a:xfrm>
+            <a:off x="3124200" y="4419600"/>
+            <a:ext cx="2895600" cy="2057400"/>
+          </a:xfrm>
+          <a:prstGeom prst="rect">
+            <a:avLst/>
+          </a:prstGeom>
+          <a:ln/>
+        </p:spPr>
+        <p:style>
+          <a:lnRef idx="2">
+            <a:schemeClr val="accent1"/>
+          </a:lnRef>
+          <a:fillRef idx="1">
+            <a:schemeClr val="lt1"/>
+          </a:fillRef>
+          <a:effectRef idx="0">
+            <a:schemeClr val="accent1"/>
+          </a:effectRef>
+          <a:fontRef idx="minor">
+            <a:schemeClr val="dk1"/>
+          </a:fontRef>
+        </p:style>
+        <p:txBody>
+          <a:bodyPr vert="horz" lIns="91440" tIns="45720" rIns="91440" bIns="45720" rtlCol="0">
+            <a:normAutofit/>
+          </a:bodyPr>
+          <a:lstStyle/>
+          <a:p>
+            <a:pPr marL="342900" indent="-342900">
+              <a:spcBef>
+                <a:spcPct val="20000"/>
+              </a:spcBef>
+              <a:buFont typeface="Arial" pitchFamily="34" charset="0"/>
+              <a:buChar char="•"/>
+            </a:pPr>
+            <a:r>
+              <a:rPr lang="en-AU" sz="1400" dirty="0" smtClean="0"/>
+              <a:t>Google Maps API Integration</a:t>
+            </a:r>
+          </a:p>
+          <a:p>
+            <a:pPr marL="342900" indent="-342900">
+              <a:spcBef>
+                <a:spcPct val="20000"/>
+              </a:spcBef>
+              <a:buFont typeface="Arial" pitchFamily="34" charset="0"/>
+              <a:buChar char="•"/>
+            </a:pPr>
+            <a:r>
+              <a:rPr lang="en-AU" sz="1400" dirty="0" smtClean="0"/>
+              <a:t>Facebook Integration</a:t>
+            </a:r>
+          </a:p>
+          <a:p>
+            <a:pPr marL="342900" indent="-342900">
+              <a:spcBef>
+                <a:spcPct val="20000"/>
+              </a:spcBef>
+              <a:buFont typeface="Arial" pitchFamily="34" charset="0"/>
+              <a:buChar char="•"/>
+            </a:pPr>
+            <a:endParaRPr lang="en-AU" sz="1400" dirty="0" smtClean="0"/>
+          </a:p>
+        </p:txBody>
+      </p:sp>
+      <p:sp>
+        <p:nvSpPr>
+          <p:cNvPr id="15" name="Rectangle 14"/>
+          <p:cNvSpPr/>
+          <p:nvPr/>
+        </p:nvSpPr>
+        <p:spPr>
+          <a:xfrm>
+            <a:off x="6096000" y="4419600"/>
+            <a:ext cx="2895600" cy="2057400"/>
+          </a:xfrm>
+          <a:prstGeom prst="rect">
+            <a:avLst/>
+          </a:prstGeom>
+          <a:ln/>
+        </p:spPr>
+        <p:style>
+          <a:lnRef idx="2">
+            <a:schemeClr val="accent1"/>
+          </a:lnRef>
+          <a:fillRef idx="1">
+            <a:schemeClr val="lt1"/>
+          </a:fillRef>
+          <a:effectRef idx="0">
+            <a:schemeClr val="accent1"/>
+          </a:effectRef>
+          <a:fontRef idx="minor">
+            <a:schemeClr val="dk1"/>
+          </a:fontRef>
+        </p:style>
+        <p:txBody>
+          <a:bodyPr vert="horz" lIns="91440" tIns="45720" rIns="91440" bIns="45720" rtlCol="0">
+            <a:normAutofit/>
+          </a:bodyPr>
+          <a:lstStyle/>
+          <a:p>
+            <a:pPr marL="342900" indent="-342900">
+              <a:spcBef>
+                <a:spcPct val="20000"/>
+              </a:spcBef>
+              <a:buFont typeface="Arial" pitchFamily="34" charset="0"/>
+              <a:buChar char="•"/>
+            </a:pPr>
+            <a:r>
+              <a:rPr lang="en-AU" sz="1400" dirty="0" smtClean="0"/>
+              <a:t>Amazon Cloud - ASW</a:t>
+            </a:r>
+          </a:p>
+          <a:p>
+            <a:pPr marL="342900" indent="-342900">
+              <a:spcBef>
+                <a:spcPct val="20000"/>
+              </a:spcBef>
+              <a:buFont typeface="Arial" pitchFamily="34" charset="0"/>
+              <a:buChar char="•"/>
+            </a:pPr>
+            <a:r>
+              <a:rPr lang="en-AU" sz="1400" dirty="0" smtClean="0"/>
+              <a:t>AWS EC2 for Virtualization</a:t>
+            </a:r>
+          </a:p>
+          <a:p>
+            <a:pPr marL="342900" indent="-342900">
+              <a:spcBef>
+                <a:spcPct val="20000"/>
+              </a:spcBef>
+              <a:buFont typeface="Arial" pitchFamily="34" charset="0"/>
+              <a:buChar char="•"/>
+            </a:pPr>
+            <a:r>
+              <a:rPr lang="en-AU" sz="1400" dirty="0" smtClean="0"/>
+              <a:t>AWS S3 for Storage</a:t>
+            </a:r>
+          </a:p>
+          <a:p>
+            <a:pPr marL="342900" indent="-342900">
+              <a:spcBef>
+                <a:spcPct val="20000"/>
+              </a:spcBef>
+              <a:buFont typeface="Arial" pitchFamily="34" charset="0"/>
+              <a:buChar char="•"/>
+            </a:pPr>
+            <a:r>
+              <a:rPr lang="en-AU" sz="1400" dirty="0" smtClean="0"/>
+              <a:t>ASW Lamda – Server Less</a:t>
+            </a:r>
+          </a:p>
+          <a:p>
+            <a:pPr marL="342900" indent="-342900">
+              <a:spcBef>
+                <a:spcPct val="20000"/>
+              </a:spcBef>
+              <a:buFont typeface="Arial" pitchFamily="34" charset="0"/>
+              <a:buChar char="•"/>
+            </a:pPr>
+            <a:r>
+              <a:rPr lang="en-AU" sz="1400" dirty="0" smtClean="0"/>
+              <a:t>Salesforce.com Cloud Technology</a:t>
+            </a:r>
+          </a:p>
+          <a:p>
+            <a:pPr marL="342900" indent="-342900">
+              <a:spcBef>
+                <a:spcPct val="20000"/>
+              </a:spcBef>
+              <a:buFont typeface="Arial" pitchFamily="34" charset="0"/>
+              <a:buChar char="•"/>
+            </a:pPr>
+            <a:endParaRPr lang="en-AU" sz="1400" dirty="0" smtClean="0"/>
+          </a:p>
+        </p:txBody>
+      </p:sp>
+      <p:sp>
+        <p:nvSpPr>
+          <p:cNvPr id="16" name="Rounded Rectangle 15"/>
+          <p:cNvSpPr/>
+          <p:nvPr/>
+        </p:nvSpPr>
+        <p:spPr>
+          <a:xfrm>
+            <a:off x="152400" y="4038600"/>
+            <a:ext cx="2895600" cy="381000"/>
+          </a:xfrm>
+          <a:prstGeom prst="roundRect">
+            <a:avLst/>
+          </a:prstGeom>
+        </p:spPr>
+        <p:style>
+          <a:lnRef idx="2">
+            <a:schemeClr val="accent1">
+              <a:shade val="50000"/>
+            </a:schemeClr>
+          </a:lnRef>
+          <a:fillRef idx="1">
+            <a:schemeClr val="accent1"/>
+          </a:fillRef>
+          <a:effectRef idx="0">
+            <a:schemeClr val="accent1"/>
+          </a:effectRef>
+          <a:fontRef idx="minor">
+            <a:schemeClr val="lt1"/>
+          </a:fontRef>
+        </p:style>
+        <p:txBody>
+          <a:bodyPr rtlCol="0" anchor="ctr"/>
+          <a:lstStyle/>
+          <a:p>
+            <a:pPr algn="ctr"/>
+            <a:r>
+              <a:rPr lang="en-AU" dirty="0" smtClean="0"/>
+              <a:t>Architecture &amp; Patterns</a:t>
+            </a:r>
+            <a:endParaRPr lang="en-AU" dirty="0" smtClean="0"/>
+          </a:p>
+        </p:txBody>
+      </p:sp>
+      <p:sp>
+        <p:nvSpPr>
+          <p:cNvPr id="17" name="Rectangle 16"/>
+          <p:cNvSpPr/>
+          <p:nvPr/>
+        </p:nvSpPr>
+        <p:spPr>
+          <a:xfrm>
+            <a:off x="152400" y="4419600"/>
+            <a:ext cx="2895600" cy="2057400"/>
+          </a:xfrm>
+          <a:prstGeom prst="rect">
+            <a:avLst/>
+          </a:prstGeom>
+          <a:ln/>
+        </p:spPr>
+        <p:style>
+          <a:lnRef idx="2">
+            <a:schemeClr val="accent1"/>
+          </a:lnRef>
+          <a:fillRef idx="1">
+            <a:schemeClr val="lt1"/>
+          </a:fillRef>
+          <a:effectRef idx="0">
+            <a:schemeClr val="accent1"/>
+          </a:effectRef>
+          <a:fontRef idx="minor">
+            <a:schemeClr val="dk1"/>
+          </a:fontRef>
+        </p:style>
+        <p:txBody>
+          <a:bodyPr vert="horz" lIns="91440" tIns="45720" rIns="91440" bIns="45720" rtlCol="0">
+            <a:normAutofit/>
+          </a:bodyPr>
+          <a:lstStyle/>
+          <a:p>
+            <a:pPr marL="342900" indent="-342900">
+              <a:spcBef>
+                <a:spcPct val="20000"/>
+              </a:spcBef>
+              <a:buFont typeface="Arial" pitchFamily="34" charset="0"/>
+              <a:buChar char="•"/>
+            </a:pPr>
+            <a:r>
+              <a:rPr lang="en-AU" sz="1400" dirty="0" smtClean="0"/>
+              <a:t>Onion Architecture</a:t>
+            </a:r>
+          </a:p>
+          <a:p>
+            <a:pPr marL="342900" indent="-342900">
+              <a:spcBef>
+                <a:spcPct val="20000"/>
+              </a:spcBef>
+              <a:buFont typeface="Arial" pitchFamily="34" charset="0"/>
+              <a:buChar char="•"/>
+            </a:pPr>
+            <a:r>
+              <a:rPr lang="en-AU" sz="1400" dirty="0" smtClean="0"/>
+              <a:t>Repository Pattern</a:t>
+            </a:r>
+          </a:p>
+          <a:p>
+            <a:pPr marL="342900" indent="-342900">
+              <a:spcBef>
+                <a:spcPct val="20000"/>
+              </a:spcBef>
+              <a:buFont typeface="Arial" pitchFamily="34" charset="0"/>
+              <a:buChar char="•"/>
+            </a:pPr>
+            <a:r>
+              <a:rPr lang="en-AU" sz="1400" dirty="0" smtClean="0"/>
+              <a:t>Unit of Work Pattern</a:t>
+            </a:r>
+          </a:p>
+          <a:p>
+            <a:pPr marL="342900" indent="-342900">
+              <a:spcBef>
+                <a:spcPct val="20000"/>
+              </a:spcBef>
+              <a:buFont typeface="Arial" pitchFamily="34" charset="0"/>
+              <a:buChar char="•"/>
+            </a:pPr>
+            <a:r>
+              <a:rPr lang="en-AU" sz="1400" dirty="0" smtClean="0"/>
+              <a:t>SOLID &amp; DRY Principles</a:t>
+            </a:r>
+          </a:p>
+          <a:p>
+            <a:pPr marL="342900" indent="-342900">
+              <a:spcBef>
+                <a:spcPct val="20000"/>
+              </a:spcBef>
+              <a:buFont typeface="Arial" pitchFamily="34" charset="0"/>
+              <a:buChar char="•"/>
+            </a:pPr>
+            <a:endParaRPr lang="en-AU" sz="1400" dirty="0" smtClean="0"/>
+          </a:p>
+          <a:p>
+            <a:pPr marL="342900" indent="-342900">
+              <a:spcBef>
+                <a:spcPct val="20000"/>
+              </a:spcBef>
+              <a:buFont typeface="Arial" pitchFamily="34" charset="0"/>
+              <a:buChar char="•"/>
+            </a:pPr>
+            <a:endParaRPr lang="en-AU" sz="1400" dirty="0" smtClean="0"/>
+          </a:p>
+        </p:txBody>
+      </p:sp>
+    </p:spTree>
+  </p:cSld>
+  <p:clrMapOvr>
+    <a:masterClrMapping/>
+  </p:clrMapOvr>
+</p:sld>
+</file>
+
+<file path=ppt/slides/slide4.xml><?xml version="1.0" encoding="utf-8"?>
+<p:sld xmlns:a="http://schemas.openxmlformats.org/drawingml/2006/main" xmlns:r="http://schemas.openxmlformats.org/officeDocument/2006/relationships" xmlns:p="http://schemas.openxmlformats.org/presentationml/2006/main">
+  <p:cSld>
+    <p:spTree>
+      <p:nvGrpSpPr>
+        <p:cNvPr id="1" name=""/>
+        <p:cNvGrpSpPr/>
+        <p:nvPr/>
+      </p:nvGrpSpPr>
+      <p:grpSpPr>
+        <a:xfrm>
+          <a:off x="0" y="0"/>
+          <a:ext cx="0" cy="0"/>
+          <a:chOff x="0" y="0"/>
+          <a:chExt cx="0" cy="0"/>
+        </a:xfrm>
+      </p:grpSpPr>
+      <p:sp>
+        <p:nvSpPr>
           <p:cNvPr id="27" name="Rectangle 26"/>
           <p:cNvSpPr/>
           <p:nvPr/>
@@ -4722,15 +5679,7 @@
             <a:pPr algn="l"/>
             <a:r>
               <a:rPr lang="en-US" sz="2000" b="1" dirty="0" smtClean="0"/>
-              <a:t>High Level </a:t>
-            </a:r>
-            <a:r>
-              <a:rPr lang="en-US" sz="2000" b="1" dirty="0" smtClean="0"/>
-              <a:t>Technical Architecture &amp; </a:t>
-            </a:r>
-            <a:r>
-              <a:rPr lang="en-US" sz="2000" b="1" dirty="0" smtClean="0"/>
-              <a:t>Deployment Model</a:t>
+              <a:t>High Level Technical Architecture &amp; Deployment Model</a:t>
             </a:r>
             <a:endParaRPr lang="en-US" sz="2000" b="1" dirty="0"/>
           </a:p>

</xml_diff>